<commit_message>
updated power point presentation, time log
</commit_message>
<xml_diff>
--- a/document/DataTypeValidator.pptx
+++ b/document/DataTypeValidator.pptx
@@ -5,22 +5,36 @@
     <p:sldMasterId id="2147483692" r:id="rId2"/>
   </p:sldMasterIdLst>
   <p:notesMasterIdLst>
-    <p:notesMasterId r:id="rId13"/>
+    <p:notesMasterId r:id="rId27"/>
   </p:notesMasterIdLst>
   <p:handoutMasterIdLst>
-    <p:handoutMasterId r:id="rId14"/>
+    <p:handoutMasterId r:id="rId28"/>
   </p:handoutMasterIdLst>
   <p:sldIdLst>
     <p:sldId id="257" r:id="rId3"/>
     <p:sldId id="259" r:id="rId4"/>
     <p:sldId id="258" r:id="rId5"/>
-    <p:sldId id="260" r:id="rId6"/>
-    <p:sldId id="261" r:id="rId7"/>
-    <p:sldId id="262" r:id="rId8"/>
-    <p:sldId id="263" r:id="rId9"/>
-    <p:sldId id="264" r:id="rId10"/>
-    <p:sldId id="265" r:id="rId11"/>
-    <p:sldId id="266" r:id="rId12"/>
+    <p:sldId id="268" r:id="rId6"/>
+    <p:sldId id="260" r:id="rId7"/>
+    <p:sldId id="261" r:id="rId8"/>
+    <p:sldId id="262" r:id="rId9"/>
+    <p:sldId id="269" r:id="rId10"/>
+    <p:sldId id="263" r:id="rId11"/>
+    <p:sldId id="270" r:id="rId12"/>
+    <p:sldId id="267" r:id="rId13"/>
+    <p:sldId id="271" r:id="rId14"/>
+    <p:sldId id="277" r:id="rId15"/>
+    <p:sldId id="278" r:id="rId16"/>
+    <p:sldId id="279" r:id="rId17"/>
+    <p:sldId id="281" r:id="rId18"/>
+    <p:sldId id="272" r:id="rId19"/>
+    <p:sldId id="276" r:id="rId20"/>
+    <p:sldId id="282" r:id="rId21"/>
+    <p:sldId id="283" r:id="rId22"/>
+    <p:sldId id="273" r:id="rId23"/>
+    <p:sldId id="264" r:id="rId24"/>
+    <p:sldId id="265" r:id="rId25"/>
+    <p:sldId id="266" r:id="rId26"/>
   </p:sldIdLst>
   <p:sldSz cx="12188825" cy="6858000"/>
   <p:notesSz cx="6858000" cy="9144000"/>
@@ -272,7 +286,7 @@
                   <a:schemeClr val="tx2"/>
                 </a:solidFill>
               </a:rPr>
-              <a:t>11/6/2016</a:t>
+              <a:t>11/9/2016</a:t>
             </a:fld>
             <a:endParaRPr>
               <a:solidFill>
@@ -462,7 +476,7 @@
             <a:fld id="{F95CF31C-F757-429C-A789-86504F04C3BE}" type="datetimeFigureOut">
               <a:rPr lang="en-US"/>
               <a:pPr/>
-              <a:t>11/6/2016</a:t>
+              <a:t>11/9/2016</a:t>
             </a:fld>
             <a:endParaRPr/>
           </a:p>
@@ -1127,7 +1141,7 @@
           <a:p>
             <a:fld id="{5706A09E-12D5-4B1D-B8BB-C300B1DDD423}" type="datetime1">
               <a:rPr lang="en-US" smtClean="0"/>
-              <a:t>11/6/2016</a:t>
+              <a:t>11/9/2016</a:t>
             </a:fld>
             <a:endParaRPr lang="en-US"/>
           </a:p>
@@ -1477,7 +1491,7 @@
           <a:p>
             <a:fld id="{D91CA53D-4C84-40AA-983E-A1E818A7FEFC}" type="datetime1">
               <a:rPr lang="en-US" smtClean="0"/>
-              <a:t>11/6/2016</a:t>
+              <a:t>11/9/2016</a:t>
             </a:fld>
             <a:endParaRPr lang="en-US"/>
           </a:p>
@@ -1669,7 +1683,7 @@
           <a:p>
             <a:fld id="{C8E2FCEE-AE66-4EAB-9C04-97F8A56A6354}" type="datetime1">
               <a:rPr lang="en-US" smtClean="0"/>
-              <a:t>11/6/2016</a:t>
+              <a:t>11/9/2016</a:t>
             </a:fld>
             <a:endParaRPr lang="en-US"/>
           </a:p>
@@ -1776,7 +1790,7 @@
           <a:p>
             <a:fld id="{15A9377B-053C-438C-8A98-92C419A6701C}" type="datetime1">
               <a:rPr lang="en-US" smtClean="0"/>
-              <a:t>11/6/2016</a:t>
+              <a:t>11/9/2016</a:t>
             </a:fld>
             <a:endParaRPr lang="en-US"/>
           </a:p>
@@ -2178,7 +2192,7 @@
           <a:p>
             <a:fld id="{B07CEF46-0123-4A75-9835-49DC49D53DE2}" type="datetime1">
               <a:rPr lang="en-US" smtClean="0"/>
-              <a:t>11/6/2016</a:t>
+              <a:t>11/9/2016</a:t>
             </a:fld>
             <a:endParaRPr lang="en-US"/>
           </a:p>
@@ -2650,7 +2664,7 @@
           <a:p>
             <a:fld id="{62A6378D-18AE-47D1-B10A-42F623B40082}" type="datetime1">
               <a:rPr lang="en-US" smtClean="0"/>
-              <a:t>11/6/2016</a:t>
+              <a:t>11/9/2016</a:t>
             </a:fld>
             <a:endParaRPr lang="en-US"/>
           </a:p>
@@ -3098,7 +3112,7 @@
           <a:p>
             <a:fld id="{321F6AE8-D704-41F6-B16A-5547B5672AC1}" type="datetime1">
               <a:rPr lang="en-US" smtClean="0"/>
-              <a:t>11/6/2016</a:t>
+              <a:t>11/9/2016</a:t>
             </a:fld>
             <a:endParaRPr lang="en-US"/>
           </a:p>
@@ -3228,7 +3242,7 @@
           <a:p>
             <a:fld id="{58AB9538-6F63-4C0B-916D-ED3F4E0A1B28}" type="datetime1">
               <a:rPr lang="en-US" smtClean="0"/>
-              <a:t>11/6/2016</a:t>
+              <a:t>11/9/2016</a:t>
             </a:fld>
             <a:endParaRPr lang="en-US"/>
           </a:p>
@@ -3335,7 +3349,7 @@
           <a:p>
             <a:fld id="{068F15BF-7116-4A9E-8022-5A2DC937F971}" type="datetime1">
               <a:rPr lang="en-US" smtClean="0"/>
-              <a:t>11/6/2016</a:t>
+              <a:t>11/9/2016</a:t>
             </a:fld>
             <a:endParaRPr lang="en-US"/>
           </a:p>
@@ -3694,7 +3708,7 @@
           <a:p>
             <a:fld id="{41B8DC91-5A3B-40CE-8C1D-279A8EF6E008}" type="datetime1">
               <a:rPr lang="en-US" smtClean="0"/>
-              <a:t>11/6/2016</a:t>
+              <a:t>11/9/2016</a:t>
             </a:fld>
             <a:endParaRPr lang="en-US"/>
           </a:p>
@@ -4033,7 +4047,7 @@
           <a:p>
             <a:fld id="{36B7C20A-B94A-4E20-B4B2-88A7825AE904}" type="datetime1">
               <a:rPr lang="en-US" smtClean="0"/>
-              <a:t>11/6/2016</a:t>
+              <a:t>11/9/2016</a:t>
             </a:fld>
             <a:endParaRPr lang="en-US"/>
           </a:p>
@@ -4302,7 +4316,7 @@
           <a:p>
             <a:fld id="{859468AF-EFCF-4AAD-ACF4-3BA83EC4AF4E}" type="datetime1">
               <a:rPr lang="en-US" smtClean="0"/>
-              <a:t>11/6/2016</a:t>
+              <a:t>11/9/2016</a:t>
             </a:fld>
             <a:endParaRPr lang="en-US"/>
           </a:p>
@@ -4972,12 +4986,12 @@
       </p:grpSpPr>
       <p:sp>
         <p:nvSpPr>
-          <p:cNvPr id="3" name="Content Placeholder 2"/>
-          <p:cNvSpPr>
-            <a:spLocks noGrp="1"/>
-          </p:cNvSpPr>
-          <p:nvPr>
-            <p:ph idx="1"/>
+          <p:cNvPr id="2" name="Title 1"/>
+          <p:cNvSpPr>
+            <a:spLocks noGrp="1"/>
+          </p:cNvSpPr>
+          <p:nvPr>
+            <p:ph type="title"/>
           </p:nvPr>
         </p:nvSpPr>
         <p:spPr/>
@@ -4985,28 +4999,9 @@
           <a:bodyPr/>
           <a:lstStyle/>
           <a:p>
-            <a:endParaRPr lang="en-US" dirty="0"/>
-          </a:p>
-        </p:txBody>
-      </p:sp>
-      <p:sp>
-        <p:nvSpPr>
-          <p:cNvPr id="2" name="Title 1"/>
-          <p:cNvSpPr>
-            <a:spLocks noGrp="1"/>
-          </p:cNvSpPr>
-          <p:nvPr>
-            <p:ph type="title"/>
-          </p:nvPr>
-        </p:nvSpPr>
-        <p:spPr/>
-        <p:txBody>
-          <a:bodyPr/>
-          <a:lstStyle/>
-          <a:p>
             <a:r>
               <a:rPr lang="en-US" dirty="0"/>
-              <a:t>Handouts</a:t>
+              <a:t>How we did it</a:t>
             </a:r>
           </a:p>
         </p:txBody>
@@ -5014,7 +5009,1144 @@
     </p:spTree>
     <p:extLst>
       <p:ext uri="{BB962C8B-B14F-4D97-AF65-F5344CB8AC3E}">
-        <p14:creationId xmlns:p14="http://schemas.microsoft.com/office/powerpoint/2010/main" val="1097249794"/>
+        <p14:creationId xmlns:p14="http://schemas.microsoft.com/office/powerpoint/2010/main" val="1118864530"/>
+      </p:ext>
+    </p:extLst>
+  </p:cSld>
+  <p:clrMapOvr>
+    <a:masterClrMapping/>
+  </p:clrMapOvr>
+  <mc:AlternateContent xmlns:mc="http://schemas.openxmlformats.org/markup-compatibility/2006" xmlns:p14="http://schemas.microsoft.com/office/powerpoint/2010/main">
+    <mc:Choice Requires="p14">
+      <p:transition spd="med" p14:dur="700">
+        <p:fade/>
+      </p:transition>
+    </mc:Choice>
+    <mc:Fallback xmlns="">
+      <p:transition spd="med">
+        <p:fade/>
+      </p:transition>
+    </mc:Fallback>
+  </mc:AlternateContent>
+</p:sld>
+</file>
+
+<file path=ppt/slides/slide11.xml><?xml version="1.0" encoding="utf-8"?>
+<p:sld xmlns:a="http://schemas.openxmlformats.org/drawingml/2006/main" xmlns:r="http://schemas.openxmlformats.org/officeDocument/2006/relationships" xmlns:p="http://schemas.openxmlformats.org/presentationml/2006/main">
+  <p:cSld>
+    <p:spTree>
+      <p:nvGrpSpPr>
+        <p:cNvPr id="1" name=""/>
+        <p:cNvGrpSpPr/>
+        <p:nvPr/>
+      </p:nvGrpSpPr>
+      <p:grpSpPr>
+        <a:xfrm>
+          <a:off x="0" y="0"/>
+          <a:ext cx="0" cy="0"/>
+          <a:chOff x="0" y="0"/>
+          <a:chExt cx="0" cy="0"/>
+        </a:xfrm>
+      </p:grpSpPr>
+      <p:sp>
+        <p:nvSpPr>
+          <p:cNvPr id="2" name="Content Placeholder 1"/>
+          <p:cNvSpPr>
+            <a:spLocks noGrp="1"/>
+          </p:cNvSpPr>
+          <p:nvPr>
+            <p:ph idx="1"/>
+          </p:nvPr>
+        </p:nvSpPr>
+        <p:spPr/>
+        <p:txBody>
+          <a:bodyPr/>
+          <a:lstStyle/>
+          <a:p>
+            <a:r>
+              <a:rPr lang="en-US" dirty="0"/>
+              <a:t>Started simple</a:t>
+            </a:r>
+          </a:p>
+          <a:p>
+            <a:pPr lvl="1"/>
+            <a:r>
+              <a:rPr lang="en-US" dirty="0"/>
+              <a:t>coding </a:t>
+            </a:r>
+            <a:r>
+              <a:rPr lang="en-US" dirty="0" err="1"/>
+              <a:t>isValid</a:t>
+            </a:r>
+            <a:r>
+              <a:rPr lang="en-US" dirty="0"/>
+              <a:t> functionality</a:t>
+            </a:r>
+          </a:p>
+          <a:p>
+            <a:pPr lvl="1"/>
+            <a:r>
+              <a:rPr lang="en-US" dirty="0"/>
+              <a:t>returning </a:t>
+            </a:r>
+            <a:r>
+              <a:rPr lang="en-US" dirty="0" err="1"/>
+              <a:t>boolean</a:t>
+            </a:r>
+            <a:endParaRPr lang="en-US" dirty="0"/>
+          </a:p>
+          <a:p>
+            <a:r>
+              <a:rPr lang="en-US" dirty="0"/>
+              <a:t>Refactored </a:t>
+            </a:r>
+          </a:p>
+          <a:p>
+            <a:pPr lvl="1"/>
+            <a:r>
+              <a:rPr lang="en-US" dirty="0"/>
+              <a:t>more complex, extensible</a:t>
+            </a:r>
+          </a:p>
+          <a:p>
+            <a:pPr lvl="1"/>
+            <a:r>
+              <a:rPr lang="en-US" dirty="0"/>
+              <a:t>returning custom error object</a:t>
+            </a:r>
+          </a:p>
+          <a:p>
+            <a:endParaRPr lang="en-US" dirty="0"/>
+          </a:p>
+        </p:txBody>
+      </p:sp>
+      <p:sp>
+        <p:nvSpPr>
+          <p:cNvPr id="3" name="Title 2"/>
+          <p:cNvSpPr>
+            <a:spLocks noGrp="1"/>
+          </p:cNvSpPr>
+          <p:nvPr>
+            <p:ph type="title"/>
+          </p:nvPr>
+        </p:nvSpPr>
+        <p:spPr/>
+        <p:txBody>
+          <a:bodyPr/>
+          <a:lstStyle/>
+          <a:p>
+            <a:r>
+              <a:rPr lang="en-US" dirty="0"/>
+              <a:t>Agile development and evolutionary architecture</a:t>
+            </a:r>
+          </a:p>
+        </p:txBody>
+      </p:sp>
+    </p:spTree>
+    <p:extLst>
+      <p:ext uri="{BB962C8B-B14F-4D97-AF65-F5344CB8AC3E}">
+        <p14:creationId xmlns:p14="http://schemas.microsoft.com/office/powerpoint/2010/main" val="790225586"/>
+      </p:ext>
+    </p:extLst>
+  </p:cSld>
+  <p:clrMapOvr>
+    <a:masterClrMapping/>
+  </p:clrMapOvr>
+  <mc:AlternateContent xmlns:mc="http://schemas.openxmlformats.org/markup-compatibility/2006" xmlns:p14="http://schemas.microsoft.com/office/powerpoint/2010/main">
+    <mc:Choice Requires="p14">
+      <p:transition spd="med" p14:dur="700">
+        <p:fade/>
+      </p:transition>
+    </mc:Choice>
+    <mc:Fallback xmlns="">
+      <p:transition spd="med">
+        <p:fade/>
+      </p:transition>
+    </mc:Fallback>
+  </mc:AlternateContent>
+</p:sld>
+</file>
+
+<file path=ppt/slides/slide12.xml><?xml version="1.0" encoding="utf-8"?>
+<p:sld xmlns:a="http://schemas.openxmlformats.org/drawingml/2006/main" xmlns:r="http://schemas.openxmlformats.org/officeDocument/2006/relationships" xmlns:p="http://schemas.openxmlformats.org/presentationml/2006/main">
+  <p:cSld>
+    <p:spTree>
+      <p:nvGrpSpPr>
+        <p:cNvPr id="1" name=""/>
+        <p:cNvGrpSpPr/>
+        <p:nvPr/>
+      </p:nvGrpSpPr>
+      <p:grpSpPr>
+        <a:xfrm>
+          <a:off x="0" y="0"/>
+          <a:ext cx="0" cy="0"/>
+          <a:chOff x="0" y="0"/>
+          <a:chExt cx="0" cy="0"/>
+        </a:xfrm>
+      </p:grpSpPr>
+      <p:sp>
+        <p:nvSpPr>
+          <p:cNvPr id="3" name="Content Placeholder 2"/>
+          <p:cNvSpPr>
+            <a:spLocks noGrp="1"/>
+          </p:cNvSpPr>
+          <p:nvPr>
+            <p:ph idx="1"/>
+          </p:nvPr>
+        </p:nvSpPr>
+        <p:spPr/>
+        <p:txBody>
+          <a:bodyPr>
+            <a:normAutofit/>
+          </a:bodyPr>
+          <a:lstStyle/>
+          <a:p>
+            <a:r>
+              <a:rPr lang="en-US" dirty="0"/>
+              <a:t>Relatively hard-coded constructor of S9 record</a:t>
+            </a:r>
+          </a:p>
+          <a:p>
+            <a:endParaRPr lang="en-US" dirty="0"/>
+          </a:p>
+        </p:txBody>
+      </p:sp>
+      <p:sp>
+        <p:nvSpPr>
+          <p:cNvPr id="2" name="Title 1"/>
+          <p:cNvSpPr>
+            <a:spLocks noGrp="1"/>
+          </p:cNvSpPr>
+          <p:nvPr>
+            <p:ph type="title"/>
+          </p:nvPr>
+        </p:nvSpPr>
+        <p:spPr/>
+        <p:txBody>
+          <a:bodyPr/>
+          <a:lstStyle/>
+          <a:p>
+            <a:r>
+              <a:rPr lang="en-US" dirty="0"/>
+              <a:t>Getting </a:t>
+            </a:r>
+            <a:r>
+              <a:rPr lang="en-US" dirty="0" err="1"/>
+              <a:t>isValid</a:t>
+            </a:r>
+            <a:r>
+              <a:rPr lang="en-US" dirty="0"/>
+              <a:t> functionality</a:t>
+            </a:r>
+          </a:p>
+        </p:txBody>
+      </p:sp>
+      <p:pic>
+        <p:nvPicPr>
+          <p:cNvPr id="4" name="Picture 3"/>
+          <p:cNvPicPr>
+            <a:picLocks noChangeAspect="1"/>
+          </p:cNvPicPr>
+          <p:nvPr/>
+        </p:nvPicPr>
+        <p:blipFill>
+          <a:blip r:embed="rId2"/>
+          <a:stretch>
+            <a:fillRect/>
+          </a:stretch>
+        </p:blipFill>
+        <p:spPr>
+          <a:xfrm>
+            <a:off x="2817812" y="2209800"/>
+            <a:ext cx="5410200" cy="4286440"/>
+          </a:xfrm>
+          <a:prstGeom prst="rect">
+            <a:avLst/>
+          </a:prstGeom>
+        </p:spPr>
+      </p:pic>
+    </p:spTree>
+    <p:extLst>
+      <p:ext uri="{BB962C8B-B14F-4D97-AF65-F5344CB8AC3E}">
+        <p14:creationId xmlns:p14="http://schemas.microsoft.com/office/powerpoint/2010/main" val="1777830014"/>
+      </p:ext>
+    </p:extLst>
+  </p:cSld>
+  <p:clrMapOvr>
+    <a:masterClrMapping/>
+  </p:clrMapOvr>
+  <mc:AlternateContent xmlns:mc="http://schemas.openxmlformats.org/markup-compatibility/2006" xmlns:p14="http://schemas.microsoft.com/office/powerpoint/2010/main">
+    <mc:Choice Requires="p14">
+      <p:transition spd="med" p14:dur="700">
+        <p:fade/>
+      </p:transition>
+    </mc:Choice>
+    <mc:Fallback xmlns="">
+      <p:transition spd="med">
+        <p:fade/>
+      </p:transition>
+    </mc:Fallback>
+  </mc:AlternateContent>
+</p:sld>
+</file>
+
+<file path=ppt/slides/slide13.xml><?xml version="1.0" encoding="utf-8"?>
+<p:sld xmlns:a="http://schemas.openxmlformats.org/drawingml/2006/main" xmlns:r="http://schemas.openxmlformats.org/officeDocument/2006/relationships" xmlns:p="http://schemas.openxmlformats.org/presentationml/2006/main">
+  <p:cSld>
+    <p:spTree>
+      <p:nvGrpSpPr>
+        <p:cNvPr id="1" name=""/>
+        <p:cNvGrpSpPr/>
+        <p:nvPr/>
+      </p:nvGrpSpPr>
+      <p:grpSpPr>
+        <a:xfrm>
+          <a:off x="0" y="0"/>
+          <a:ext cx="0" cy="0"/>
+          <a:chOff x="0" y="0"/>
+          <a:chExt cx="0" cy="0"/>
+        </a:xfrm>
+      </p:grpSpPr>
+      <p:sp>
+        <p:nvSpPr>
+          <p:cNvPr id="3" name="Content Placeholder 2"/>
+          <p:cNvSpPr>
+            <a:spLocks noGrp="1"/>
+          </p:cNvSpPr>
+          <p:nvPr>
+            <p:ph idx="1"/>
+          </p:nvPr>
+        </p:nvSpPr>
+        <p:spPr/>
+        <p:txBody>
+          <a:bodyPr>
+            <a:normAutofit/>
+          </a:bodyPr>
+          <a:lstStyle/>
+          <a:p>
+            <a:r>
+              <a:rPr lang="en-US" dirty="0"/>
+              <a:t>Initial </a:t>
+            </a:r>
+            <a:r>
+              <a:rPr lang="en-US" dirty="0" err="1"/>
+              <a:t>isValid</a:t>
+            </a:r>
+            <a:r>
+              <a:rPr lang="en-US" dirty="0"/>
+              <a:t>() method of S9 record</a:t>
+            </a:r>
+          </a:p>
+          <a:p>
+            <a:endParaRPr lang="en-US" dirty="0"/>
+          </a:p>
+        </p:txBody>
+      </p:sp>
+      <p:sp>
+        <p:nvSpPr>
+          <p:cNvPr id="2" name="Title 1"/>
+          <p:cNvSpPr>
+            <a:spLocks noGrp="1"/>
+          </p:cNvSpPr>
+          <p:nvPr>
+            <p:ph type="title"/>
+          </p:nvPr>
+        </p:nvSpPr>
+        <p:spPr/>
+        <p:txBody>
+          <a:bodyPr/>
+          <a:lstStyle/>
+          <a:p>
+            <a:r>
+              <a:rPr lang="en-US" dirty="0"/>
+              <a:t>Getting </a:t>
+            </a:r>
+            <a:r>
+              <a:rPr lang="en-US" dirty="0" err="1"/>
+              <a:t>isValid</a:t>
+            </a:r>
+            <a:r>
+              <a:rPr lang="en-US" dirty="0"/>
+              <a:t> functionality</a:t>
+            </a:r>
+          </a:p>
+        </p:txBody>
+      </p:sp>
+      <p:pic>
+        <p:nvPicPr>
+          <p:cNvPr id="5" name="Picture 4"/>
+          <p:cNvPicPr>
+            <a:picLocks noChangeAspect="1"/>
+          </p:cNvPicPr>
+          <p:nvPr/>
+        </p:nvPicPr>
+        <p:blipFill>
+          <a:blip r:embed="rId2"/>
+          <a:stretch>
+            <a:fillRect/>
+          </a:stretch>
+        </p:blipFill>
+        <p:spPr>
+          <a:xfrm>
+            <a:off x="2894012" y="2209800"/>
+            <a:ext cx="5715000" cy="4418389"/>
+          </a:xfrm>
+          <a:prstGeom prst="rect">
+            <a:avLst/>
+          </a:prstGeom>
+        </p:spPr>
+      </p:pic>
+    </p:spTree>
+    <p:extLst>
+      <p:ext uri="{BB962C8B-B14F-4D97-AF65-F5344CB8AC3E}">
+        <p14:creationId xmlns:p14="http://schemas.microsoft.com/office/powerpoint/2010/main" val="4221413131"/>
+      </p:ext>
+    </p:extLst>
+  </p:cSld>
+  <p:clrMapOvr>
+    <a:masterClrMapping/>
+  </p:clrMapOvr>
+  <mc:AlternateContent xmlns:mc="http://schemas.openxmlformats.org/markup-compatibility/2006" xmlns:p14="http://schemas.microsoft.com/office/powerpoint/2010/main">
+    <mc:Choice Requires="p14">
+      <p:transition spd="med" p14:dur="700">
+        <p:fade/>
+      </p:transition>
+    </mc:Choice>
+    <mc:Fallback xmlns="">
+      <p:transition spd="med">
+        <p:fade/>
+      </p:transition>
+    </mc:Fallback>
+  </mc:AlternateContent>
+</p:sld>
+</file>
+
+<file path=ppt/slides/slide14.xml><?xml version="1.0" encoding="utf-8"?>
+<p:sld xmlns:a="http://schemas.openxmlformats.org/drawingml/2006/main" xmlns:r="http://schemas.openxmlformats.org/officeDocument/2006/relationships" xmlns:p="http://schemas.openxmlformats.org/presentationml/2006/main">
+  <p:cSld>
+    <p:spTree>
+      <p:nvGrpSpPr>
+        <p:cNvPr id="1" name=""/>
+        <p:cNvGrpSpPr/>
+        <p:nvPr/>
+      </p:nvGrpSpPr>
+      <p:grpSpPr>
+        <a:xfrm>
+          <a:off x="0" y="0"/>
+          <a:ext cx="0" cy="0"/>
+          <a:chOff x="0" y="0"/>
+          <a:chExt cx="0" cy="0"/>
+        </a:xfrm>
+      </p:grpSpPr>
+      <p:sp>
+        <p:nvSpPr>
+          <p:cNvPr id="3" name="Content Placeholder 2"/>
+          <p:cNvSpPr>
+            <a:spLocks noGrp="1"/>
+          </p:cNvSpPr>
+          <p:nvPr>
+            <p:ph idx="1"/>
+          </p:nvPr>
+        </p:nvSpPr>
+        <p:spPr/>
+        <p:txBody>
+          <a:bodyPr>
+            <a:normAutofit/>
+          </a:bodyPr>
+          <a:lstStyle/>
+          <a:p>
+            <a:r>
+              <a:rPr lang="en-US" dirty="0"/>
+              <a:t>More abstract record definition</a:t>
+            </a:r>
+          </a:p>
+          <a:p>
+            <a:endParaRPr lang="en-US" dirty="0"/>
+          </a:p>
+        </p:txBody>
+      </p:sp>
+      <p:sp>
+        <p:nvSpPr>
+          <p:cNvPr id="2" name="Title 1"/>
+          <p:cNvSpPr>
+            <a:spLocks noGrp="1"/>
+          </p:cNvSpPr>
+          <p:nvPr>
+            <p:ph type="title"/>
+          </p:nvPr>
+        </p:nvSpPr>
+        <p:spPr/>
+        <p:txBody>
+          <a:bodyPr/>
+          <a:lstStyle/>
+          <a:p>
+            <a:r>
+              <a:rPr lang="en-US" dirty="0"/>
+              <a:t>Getting </a:t>
+            </a:r>
+            <a:r>
+              <a:rPr lang="en-US" dirty="0" err="1"/>
+              <a:t>isValid</a:t>
+            </a:r>
+            <a:r>
+              <a:rPr lang="en-US" dirty="0"/>
+              <a:t> functionality</a:t>
+            </a:r>
+          </a:p>
+        </p:txBody>
+      </p:sp>
+      <p:pic>
+        <p:nvPicPr>
+          <p:cNvPr id="5" name="Picture 4"/>
+          <p:cNvPicPr>
+            <a:picLocks noChangeAspect="1"/>
+          </p:cNvPicPr>
+          <p:nvPr/>
+        </p:nvPicPr>
+        <p:blipFill>
+          <a:blip r:embed="rId2"/>
+          <a:stretch>
+            <a:fillRect/>
+          </a:stretch>
+        </p:blipFill>
+        <p:spPr>
+          <a:xfrm>
+            <a:off x="4836429" y="2524387"/>
+            <a:ext cx="6219597" cy="3465963"/>
+          </a:xfrm>
+          <a:prstGeom prst="rect">
+            <a:avLst/>
+          </a:prstGeom>
+        </p:spPr>
+      </p:pic>
+      <p:pic>
+        <p:nvPicPr>
+          <p:cNvPr id="6" name="Picture 5"/>
+          <p:cNvPicPr>
+            <a:picLocks noChangeAspect="1"/>
+          </p:cNvPicPr>
+          <p:nvPr/>
+        </p:nvPicPr>
+        <p:blipFill>
+          <a:blip r:embed="rId3"/>
+          <a:stretch>
+            <a:fillRect/>
+          </a:stretch>
+        </p:blipFill>
+        <p:spPr>
+          <a:xfrm>
+            <a:off x="1522412" y="2514600"/>
+            <a:ext cx="3044029" cy="1811323"/>
+          </a:xfrm>
+          <a:prstGeom prst="rect">
+            <a:avLst/>
+          </a:prstGeom>
+        </p:spPr>
+      </p:pic>
+    </p:spTree>
+    <p:extLst>
+      <p:ext uri="{BB962C8B-B14F-4D97-AF65-F5344CB8AC3E}">
+        <p14:creationId xmlns:p14="http://schemas.microsoft.com/office/powerpoint/2010/main" val="4030230963"/>
+      </p:ext>
+    </p:extLst>
+  </p:cSld>
+  <p:clrMapOvr>
+    <a:masterClrMapping/>
+  </p:clrMapOvr>
+  <mc:AlternateContent xmlns:mc="http://schemas.openxmlformats.org/markup-compatibility/2006" xmlns:p14="http://schemas.microsoft.com/office/powerpoint/2010/main">
+    <mc:Choice Requires="p14">
+      <p:transition spd="med" p14:dur="700">
+        <p:fade/>
+      </p:transition>
+    </mc:Choice>
+    <mc:Fallback xmlns="">
+      <p:transition spd="med">
+        <p:fade/>
+      </p:transition>
+    </mc:Fallback>
+  </mc:AlternateContent>
+</p:sld>
+</file>
+
+<file path=ppt/slides/slide15.xml><?xml version="1.0" encoding="utf-8"?>
+<p:sld xmlns:a="http://schemas.openxmlformats.org/drawingml/2006/main" xmlns:r="http://schemas.openxmlformats.org/officeDocument/2006/relationships" xmlns:p="http://schemas.openxmlformats.org/presentationml/2006/main">
+  <p:cSld>
+    <p:spTree>
+      <p:nvGrpSpPr>
+        <p:cNvPr id="1" name=""/>
+        <p:cNvGrpSpPr/>
+        <p:nvPr/>
+      </p:nvGrpSpPr>
+      <p:grpSpPr>
+        <a:xfrm>
+          <a:off x="0" y="0"/>
+          <a:ext cx="0" cy="0"/>
+          <a:chOff x="0" y="0"/>
+          <a:chExt cx="0" cy="0"/>
+        </a:xfrm>
+      </p:grpSpPr>
+      <p:sp>
+        <p:nvSpPr>
+          <p:cNvPr id="3" name="Content Placeholder 2"/>
+          <p:cNvSpPr>
+            <a:spLocks noGrp="1"/>
+          </p:cNvSpPr>
+          <p:nvPr>
+            <p:ph idx="1"/>
+          </p:nvPr>
+        </p:nvSpPr>
+        <p:spPr/>
+        <p:txBody>
+          <a:bodyPr>
+            <a:normAutofit/>
+          </a:bodyPr>
+          <a:lstStyle/>
+          <a:p>
+            <a:r>
+              <a:rPr lang="en-US" dirty="0"/>
+              <a:t>Validator engine (record-level)</a:t>
+            </a:r>
+          </a:p>
+          <a:p>
+            <a:endParaRPr lang="en-US" dirty="0"/>
+          </a:p>
+        </p:txBody>
+      </p:sp>
+      <p:sp>
+        <p:nvSpPr>
+          <p:cNvPr id="2" name="Title 1"/>
+          <p:cNvSpPr>
+            <a:spLocks noGrp="1"/>
+          </p:cNvSpPr>
+          <p:nvPr>
+            <p:ph type="title"/>
+          </p:nvPr>
+        </p:nvSpPr>
+        <p:spPr/>
+        <p:txBody>
+          <a:bodyPr/>
+          <a:lstStyle/>
+          <a:p>
+            <a:r>
+              <a:rPr lang="en-US" dirty="0"/>
+              <a:t>Getting </a:t>
+            </a:r>
+            <a:r>
+              <a:rPr lang="en-US" dirty="0" err="1"/>
+              <a:t>isValid</a:t>
+            </a:r>
+            <a:r>
+              <a:rPr lang="en-US" dirty="0"/>
+              <a:t> functionality</a:t>
+            </a:r>
+          </a:p>
+        </p:txBody>
+      </p:sp>
+      <p:pic>
+        <p:nvPicPr>
+          <p:cNvPr id="4" name="Picture 3"/>
+          <p:cNvPicPr>
+            <a:picLocks noChangeAspect="1"/>
+          </p:cNvPicPr>
+          <p:nvPr/>
+        </p:nvPicPr>
+        <p:blipFill>
+          <a:blip r:embed="rId2"/>
+          <a:stretch>
+            <a:fillRect/>
+          </a:stretch>
+        </p:blipFill>
+        <p:spPr>
+          <a:xfrm>
+            <a:off x="1903412" y="2133600"/>
+            <a:ext cx="7924800" cy="4574478"/>
+          </a:xfrm>
+          <a:prstGeom prst="rect">
+            <a:avLst/>
+          </a:prstGeom>
+        </p:spPr>
+      </p:pic>
+    </p:spTree>
+    <p:extLst>
+      <p:ext uri="{BB962C8B-B14F-4D97-AF65-F5344CB8AC3E}">
+        <p14:creationId xmlns:p14="http://schemas.microsoft.com/office/powerpoint/2010/main" val="1658958846"/>
+      </p:ext>
+    </p:extLst>
+  </p:cSld>
+  <p:clrMapOvr>
+    <a:masterClrMapping/>
+  </p:clrMapOvr>
+  <mc:AlternateContent xmlns:mc="http://schemas.openxmlformats.org/markup-compatibility/2006" xmlns:p14="http://schemas.microsoft.com/office/powerpoint/2010/main">
+    <mc:Choice Requires="p14">
+      <p:transition spd="med" p14:dur="700">
+        <p:fade/>
+      </p:transition>
+    </mc:Choice>
+    <mc:Fallback xmlns="">
+      <p:transition spd="med">
+        <p:fade/>
+      </p:transition>
+    </mc:Fallback>
+  </mc:AlternateContent>
+</p:sld>
+</file>
+
+<file path=ppt/slides/slide16.xml><?xml version="1.0" encoding="utf-8"?>
+<p:sld xmlns:a="http://schemas.openxmlformats.org/drawingml/2006/main" xmlns:r="http://schemas.openxmlformats.org/officeDocument/2006/relationships" xmlns:p="http://schemas.openxmlformats.org/presentationml/2006/main">
+  <p:cSld>
+    <p:spTree>
+      <p:nvGrpSpPr>
+        <p:cNvPr id="1" name=""/>
+        <p:cNvGrpSpPr/>
+        <p:nvPr/>
+      </p:nvGrpSpPr>
+      <p:grpSpPr>
+        <a:xfrm>
+          <a:off x="0" y="0"/>
+          <a:ext cx="0" cy="0"/>
+          <a:chOff x="0" y="0"/>
+          <a:chExt cx="0" cy="0"/>
+        </a:xfrm>
+      </p:grpSpPr>
+      <p:sp>
+        <p:nvSpPr>
+          <p:cNvPr id="3" name="Content Placeholder 2"/>
+          <p:cNvSpPr>
+            <a:spLocks noGrp="1"/>
+          </p:cNvSpPr>
+          <p:nvPr>
+            <p:ph idx="1"/>
+          </p:nvPr>
+        </p:nvSpPr>
+        <p:spPr/>
+        <p:txBody>
+          <a:bodyPr>
+            <a:normAutofit/>
+          </a:bodyPr>
+          <a:lstStyle/>
+          <a:p>
+            <a:r>
+              <a:rPr lang="en-US" dirty="0"/>
+              <a:t>Validator engine (file-level)</a:t>
+            </a:r>
+          </a:p>
+          <a:p>
+            <a:endParaRPr lang="en-US" dirty="0"/>
+          </a:p>
+        </p:txBody>
+      </p:sp>
+      <p:sp>
+        <p:nvSpPr>
+          <p:cNvPr id="2" name="Title 1"/>
+          <p:cNvSpPr>
+            <a:spLocks noGrp="1"/>
+          </p:cNvSpPr>
+          <p:nvPr>
+            <p:ph type="title"/>
+          </p:nvPr>
+        </p:nvSpPr>
+        <p:spPr/>
+        <p:txBody>
+          <a:bodyPr/>
+          <a:lstStyle/>
+          <a:p>
+            <a:r>
+              <a:rPr lang="en-US" dirty="0"/>
+              <a:t>Getting </a:t>
+            </a:r>
+            <a:r>
+              <a:rPr lang="en-US" dirty="0" err="1"/>
+              <a:t>isValid</a:t>
+            </a:r>
+            <a:r>
+              <a:rPr lang="en-US" dirty="0"/>
+              <a:t> functionality</a:t>
+            </a:r>
+          </a:p>
+        </p:txBody>
+      </p:sp>
+      <p:pic>
+        <p:nvPicPr>
+          <p:cNvPr id="5" name="Picture 4"/>
+          <p:cNvPicPr>
+            <a:picLocks noChangeAspect="1"/>
+          </p:cNvPicPr>
+          <p:nvPr/>
+        </p:nvPicPr>
+        <p:blipFill>
+          <a:blip r:embed="rId2"/>
+          <a:stretch>
+            <a:fillRect/>
+          </a:stretch>
+        </p:blipFill>
+        <p:spPr>
+          <a:xfrm>
+            <a:off x="2436812" y="2209800"/>
+            <a:ext cx="7219950" cy="4441903"/>
+          </a:xfrm>
+          <a:prstGeom prst="rect">
+            <a:avLst/>
+          </a:prstGeom>
+        </p:spPr>
+      </p:pic>
+    </p:spTree>
+    <p:extLst>
+      <p:ext uri="{BB962C8B-B14F-4D97-AF65-F5344CB8AC3E}">
+        <p14:creationId xmlns:p14="http://schemas.microsoft.com/office/powerpoint/2010/main" val="2733786578"/>
+      </p:ext>
+    </p:extLst>
+  </p:cSld>
+  <p:clrMapOvr>
+    <a:masterClrMapping/>
+  </p:clrMapOvr>
+  <mc:AlternateContent xmlns:mc="http://schemas.openxmlformats.org/markup-compatibility/2006" xmlns:p14="http://schemas.microsoft.com/office/powerpoint/2010/main">
+    <mc:Choice Requires="p14">
+      <p:transition spd="med" p14:dur="700">
+        <p:fade/>
+      </p:transition>
+    </mc:Choice>
+    <mc:Fallback xmlns="">
+      <p:transition spd="med">
+        <p:fade/>
+      </p:transition>
+    </mc:Fallback>
+  </mc:AlternateContent>
+</p:sld>
+</file>
+
+<file path=ppt/slides/slide17.xml><?xml version="1.0" encoding="utf-8"?>
+<p:sld xmlns:a="http://schemas.openxmlformats.org/drawingml/2006/main" xmlns:r="http://schemas.openxmlformats.org/officeDocument/2006/relationships" xmlns:p="http://schemas.openxmlformats.org/presentationml/2006/main">
+  <p:cSld>
+    <p:spTree>
+      <p:nvGrpSpPr>
+        <p:cNvPr id="1" name=""/>
+        <p:cNvGrpSpPr/>
+        <p:nvPr/>
+      </p:nvGrpSpPr>
+      <p:grpSpPr>
+        <a:xfrm>
+          <a:off x="0" y="0"/>
+          <a:ext cx="0" cy="0"/>
+          <a:chOff x="0" y="0"/>
+          <a:chExt cx="0" cy="0"/>
+        </a:xfrm>
+      </p:grpSpPr>
+      <p:sp>
+        <p:nvSpPr>
+          <p:cNvPr id="3" name="Content Placeholder 2"/>
+          <p:cNvSpPr>
+            <a:spLocks noGrp="1"/>
+          </p:cNvSpPr>
+          <p:nvPr>
+            <p:ph idx="1"/>
+          </p:nvPr>
+        </p:nvSpPr>
+        <p:spPr/>
+        <p:txBody>
+          <a:bodyPr>
+            <a:normAutofit/>
+          </a:bodyPr>
+          <a:lstStyle/>
+          <a:p>
+            <a:r>
+              <a:rPr lang="en-US" dirty="0"/>
+              <a:t>Simple </a:t>
+            </a:r>
+            <a:r>
+              <a:rPr lang="en-US" dirty="0" err="1"/>
+              <a:t>boolean</a:t>
+            </a:r>
+            <a:endParaRPr lang="en-US" dirty="0"/>
+          </a:p>
+          <a:p>
+            <a:r>
+              <a:rPr lang="en-US" dirty="0"/>
+              <a:t>Custom error object	</a:t>
+            </a:r>
+          </a:p>
+          <a:p>
+            <a:pPr lvl="1"/>
+            <a:r>
+              <a:rPr lang="en-US" dirty="0"/>
+              <a:t>Stop at first broken line in file?</a:t>
+            </a:r>
+          </a:p>
+          <a:p>
+            <a:pPr lvl="1"/>
+            <a:r>
+              <a:rPr lang="en-US" dirty="0"/>
+              <a:t>Stop at first broken field in record?</a:t>
+            </a:r>
+          </a:p>
+          <a:p>
+            <a:endParaRPr lang="en-US" dirty="0"/>
+          </a:p>
+        </p:txBody>
+      </p:sp>
+      <p:sp>
+        <p:nvSpPr>
+          <p:cNvPr id="2" name="Title 1"/>
+          <p:cNvSpPr>
+            <a:spLocks noGrp="1"/>
+          </p:cNvSpPr>
+          <p:nvPr>
+            <p:ph type="title"/>
+          </p:nvPr>
+        </p:nvSpPr>
+        <p:spPr/>
+        <p:txBody>
+          <a:bodyPr/>
+          <a:lstStyle/>
+          <a:p>
+            <a:r>
+              <a:rPr lang="en-US" dirty="0"/>
+              <a:t>What to return from </a:t>
+            </a:r>
+            <a:r>
+              <a:rPr lang="en-US" dirty="0" err="1"/>
+              <a:t>isValid</a:t>
+            </a:r>
+            <a:r>
+              <a:rPr lang="en-US" dirty="0"/>
+              <a:t>?</a:t>
+            </a:r>
+          </a:p>
+        </p:txBody>
+      </p:sp>
+    </p:spTree>
+    <p:extLst>
+      <p:ext uri="{BB962C8B-B14F-4D97-AF65-F5344CB8AC3E}">
+        <p14:creationId xmlns:p14="http://schemas.microsoft.com/office/powerpoint/2010/main" val="3324673104"/>
+      </p:ext>
+    </p:extLst>
+  </p:cSld>
+  <p:clrMapOvr>
+    <a:masterClrMapping/>
+  </p:clrMapOvr>
+  <mc:AlternateContent xmlns:mc="http://schemas.openxmlformats.org/markup-compatibility/2006" xmlns:p14="http://schemas.microsoft.com/office/powerpoint/2010/main">
+    <mc:Choice Requires="p14">
+      <p:transition spd="med" p14:dur="700">
+        <p:fade/>
+      </p:transition>
+    </mc:Choice>
+    <mc:Fallback xmlns="">
+      <p:transition spd="med">
+        <p:fade/>
+      </p:transition>
+    </mc:Fallback>
+  </mc:AlternateContent>
+</p:sld>
+</file>
+
+<file path=ppt/slides/slide18.xml><?xml version="1.0" encoding="utf-8"?>
+<p:sld xmlns:a="http://schemas.openxmlformats.org/drawingml/2006/main" xmlns:r="http://schemas.openxmlformats.org/officeDocument/2006/relationships" xmlns:p="http://schemas.openxmlformats.org/presentationml/2006/main">
+  <p:cSld>
+    <p:spTree>
+      <p:nvGrpSpPr>
+        <p:cNvPr id="1" name=""/>
+        <p:cNvGrpSpPr/>
+        <p:nvPr/>
+      </p:nvGrpSpPr>
+      <p:grpSpPr>
+        <a:xfrm>
+          <a:off x="0" y="0"/>
+          <a:ext cx="0" cy="0"/>
+          <a:chOff x="0" y="0"/>
+          <a:chExt cx="0" cy="0"/>
+        </a:xfrm>
+      </p:grpSpPr>
+      <p:sp>
+        <p:nvSpPr>
+          <p:cNvPr id="3" name="Content Placeholder 2"/>
+          <p:cNvSpPr>
+            <a:spLocks noGrp="1"/>
+          </p:cNvSpPr>
+          <p:nvPr>
+            <p:ph idx="1"/>
+          </p:nvPr>
+        </p:nvSpPr>
+        <p:spPr/>
+        <p:txBody>
+          <a:bodyPr>
+            <a:normAutofit/>
+          </a:bodyPr>
+          <a:lstStyle/>
+          <a:p>
+            <a:r>
+              <a:rPr lang="en-US" dirty="0"/>
+              <a:t>Simple OK/Not OK status</a:t>
+            </a:r>
+          </a:p>
+          <a:p>
+            <a:pPr lvl="1"/>
+            <a:r>
+              <a:rPr lang="en-US" dirty="0"/>
+              <a:t>As text on .</a:t>
+            </a:r>
+            <a:r>
+              <a:rPr lang="en-US" dirty="0" err="1"/>
+              <a:t>jsp</a:t>
+            </a:r>
+            <a:endParaRPr lang="en-US" dirty="0"/>
+          </a:p>
+          <a:p>
+            <a:r>
+              <a:rPr lang="en-US" dirty="0"/>
+              <a:t>Complex error object</a:t>
+            </a:r>
+          </a:p>
+          <a:p>
+            <a:pPr lvl="1"/>
+            <a:r>
+              <a:rPr lang="en-US" dirty="0"/>
+              <a:t>As String on .</a:t>
+            </a:r>
+            <a:r>
+              <a:rPr lang="en-US" dirty="0" err="1"/>
+              <a:t>jsp</a:t>
+            </a:r>
+            <a:endParaRPr lang="en-US" dirty="0"/>
+          </a:p>
+          <a:p>
+            <a:pPr lvl="1"/>
+            <a:r>
+              <a:rPr lang="en-US" dirty="0"/>
+              <a:t>As something prettier on .</a:t>
+            </a:r>
+            <a:r>
+              <a:rPr lang="en-US" dirty="0" err="1"/>
+              <a:t>jsp</a:t>
+            </a:r>
+            <a:endParaRPr lang="en-US" dirty="0"/>
+          </a:p>
+          <a:p>
+            <a:pPr lvl="1"/>
+            <a:r>
+              <a:rPr lang="en-US" dirty="0"/>
+              <a:t>As JSON/XML on .</a:t>
+            </a:r>
+            <a:r>
+              <a:rPr lang="en-US" dirty="0" err="1"/>
+              <a:t>jsp</a:t>
+            </a:r>
+            <a:endParaRPr lang="en-US" dirty="0"/>
+          </a:p>
+        </p:txBody>
+      </p:sp>
+      <p:sp>
+        <p:nvSpPr>
+          <p:cNvPr id="2" name="Title 1"/>
+          <p:cNvSpPr>
+            <a:spLocks noGrp="1"/>
+          </p:cNvSpPr>
+          <p:nvPr>
+            <p:ph type="title"/>
+          </p:nvPr>
+        </p:nvSpPr>
+        <p:spPr/>
+        <p:txBody>
+          <a:bodyPr/>
+          <a:lstStyle/>
+          <a:p>
+            <a:r>
+              <a:rPr lang="en-US" dirty="0"/>
+              <a:t>What to display in web service?</a:t>
+            </a:r>
+          </a:p>
+        </p:txBody>
+      </p:sp>
+    </p:spTree>
+    <p:extLst>
+      <p:ext uri="{BB962C8B-B14F-4D97-AF65-F5344CB8AC3E}">
+        <p14:creationId xmlns:p14="http://schemas.microsoft.com/office/powerpoint/2010/main" val="3609304593"/>
+      </p:ext>
+    </p:extLst>
+  </p:cSld>
+  <p:clrMapOvr>
+    <a:masterClrMapping/>
+  </p:clrMapOvr>
+  <mc:AlternateContent xmlns:mc="http://schemas.openxmlformats.org/markup-compatibility/2006" xmlns:p14="http://schemas.microsoft.com/office/powerpoint/2010/main">
+    <mc:Choice Requires="p14">
+      <p:transition spd="med" p14:dur="700">
+        <p:fade/>
+      </p:transition>
+    </mc:Choice>
+    <mc:Fallback xmlns="">
+      <p:transition spd="med">
+        <p:fade/>
+      </p:transition>
+    </mc:Fallback>
+  </mc:AlternateContent>
+</p:sld>
+</file>
+
+<file path=ppt/slides/slide19.xml><?xml version="1.0" encoding="utf-8"?>
+<p:sld xmlns:a="http://schemas.openxmlformats.org/drawingml/2006/main" xmlns:r="http://schemas.openxmlformats.org/officeDocument/2006/relationships" xmlns:p="http://schemas.openxmlformats.org/presentationml/2006/main">
+  <p:cSld>
+    <p:spTree>
+      <p:nvGrpSpPr>
+        <p:cNvPr id="1" name=""/>
+        <p:cNvGrpSpPr/>
+        <p:nvPr/>
+      </p:nvGrpSpPr>
+      <p:grpSpPr>
+        <a:xfrm>
+          <a:off x="0" y="0"/>
+          <a:ext cx="0" cy="0"/>
+          <a:chOff x="0" y="0"/>
+          <a:chExt cx="0" cy="0"/>
+        </a:xfrm>
+      </p:grpSpPr>
+      <p:sp>
+        <p:nvSpPr>
+          <p:cNvPr id="2" name="Title 1"/>
+          <p:cNvSpPr>
+            <a:spLocks noGrp="1"/>
+          </p:cNvSpPr>
+          <p:nvPr>
+            <p:ph type="title"/>
+          </p:nvPr>
+        </p:nvSpPr>
+        <p:spPr/>
+        <p:txBody>
+          <a:bodyPr/>
+          <a:lstStyle/>
+          <a:p>
+            <a:r>
+              <a:rPr lang="en-US" dirty="0"/>
+              <a:t>What to display in web service?</a:t>
+            </a:r>
+          </a:p>
+        </p:txBody>
+      </p:sp>
+      <p:pic>
+        <p:nvPicPr>
+          <p:cNvPr id="8" name="Picture 7"/>
+          <p:cNvPicPr>
+            <a:picLocks noChangeAspect="1"/>
+          </p:cNvPicPr>
+          <p:nvPr/>
+        </p:nvPicPr>
+        <p:blipFill>
+          <a:blip r:embed="rId2"/>
+          <a:stretch>
+            <a:fillRect/>
+          </a:stretch>
+        </p:blipFill>
+        <p:spPr>
+          <a:xfrm>
+            <a:off x="2360612" y="1448033"/>
+            <a:ext cx="6431797" cy="5334000"/>
+          </a:xfrm>
+          <a:prstGeom prst="rect">
+            <a:avLst/>
+          </a:prstGeom>
+        </p:spPr>
+      </p:pic>
+    </p:spTree>
+    <p:extLst>
+      <p:ext uri="{BB962C8B-B14F-4D97-AF65-F5344CB8AC3E}">
+        <p14:creationId xmlns:p14="http://schemas.microsoft.com/office/powerpoint/2010/main" val="2926848408"/>
       </p:ext>
     </p:extLst>
   </p:cSld>
@@ -5126,6 +6258,422 @@
 </p:sld>
 </file>
 
+<file path=ppt/slides/slide20.xml><?xml version="1.0" encoding="utf-8"?>
+<p:sld xmlns:a="http://schemas.openxmlformats.org/drawingml/2006/main" xmlns:r="http://schemas.openxmlformats.org/officeDocument/2006/relationships" xmlns:p="http://schemas.openxmlformats.org/presentationml/2006/main">
+  <p:cSld>
+    <p:spTree>
+      <p:nvGrpSpPr>
+        <p:cNvPr id="1" name=""/>
+        <p:cNvGrpSpPr/>
+        <p:nvPr/>
+      </p:nvGrpSpPr>
+      <p:grpSpPr>
+        <a:xfrm>
+          <a:off x="0" y="0"/>
+          <a:ext cx="0" cy="0"/>
+          <a:chOff x="0" y="0"/>
+          <a:chExt cx="0" cy="0"/>
+        </a:xfrm>
+      </p:grpSpPr>
+      <p:sp>
+        <p:nvSpPr>
+          <p:cNvPr id="2" name="Title 1"/>
+          <p:cNvSpPr>
+            <a:spLocks noGrp="1"/>
+          </p:cNvSpPr>
+          <p:nvPr>
+            <p:ph type="title"/>
+          </p:nvPr>
+        </p:nvSpPr>
+        <p:spPr/>
+        <p:txBody>
+          <a:bodyPr/>
+          <a:lstStyle/>
+          <a:p>
+            <a:r>
+              <a:rPr lang="en-US" dirty="0"/>
+              <a:t>What to display in web service?</a:t>
+            </a:r>
+          </a:p>
+        </p:txBody>
+      </p:sp>
+      <p:pic>
+        <p:nvPicPr>
+          <p:cNvPr id="6" name="Picture 5"/>
+          <p:cNvPicPr>
+            <a:picLocks noChangeAspect="1"/>
+          </p:cNvPicPr>
+          <p:nvPr/>
+        </p:nvPicPr>
+        <p:blipFill>
+          <a:blip r:embed="rId2"/>
+          <a:stretch>
+            <a:fillRect/>
+          </a:stretch>
+        </p:blipFill>
+        <p:spPr>
+          <a:xfrm>
+            <a:off x="2531565" y="2443025"/>
+            <a:ext cx="7125694" cy="1971950"/>
+          </a:xfrm>
+          <a:prstGeom prst="rect">
+            <a:avLst/>
+          </a:prstGeom>
+        </p:spPr>
+      </p:pic>
+    </p:spTree>
+    <p:extLst>
+      <p:ext uri="{BB962C8B-B14F-4D97-AF65-F5344CB8AC3E}">
+        <p14:creationId xmlns:p14="http://schemas.microsoft.com/office/powerpoint/2010/main" val="1519989682"/>
+      </p:ext>
+    </p:extLst>
+  </p:cSld>
+  <p:clrMapOvr>
+    <a:masterClrMapping/>
+  </p:clrMapOvr>
+  <mc:AlternateContent xmlns:mc="http://schemas.openxmlformats.org/markup-compatibility/2006" xmlns:p14="http://schemas.microsoft.com/office/powerpoint/2010/main">
+    <mc:Choice Requires="p14">
+      <p:transition spd="med" p14:dur="700">
+        <p:fade/>
+      </p:transition>
+    </mc:Choice>
+    <mc:Fallback xmlns="">
+      <p:transition spd="med">
+        <p:fade/>
+      </p:transition>
+    </mc:Fallback>
+  </mc:AlternateContent>
+</p:sld>
+</file>
+
+<file path=ppt/slides/slide21.xml><?xml version="1.0" encoding="utf-8"?>
+<p:sld xmlns:a="http://schemas.openxmlformats.org/drawingml/2006/main" xmlns:r="http://schemas.openxmlformats.org/officeDocument/2006/relationships" xmlns:p="http://schemas.openxmlformats.org/presentationml/2006/main">
+  <p:cSld>
+    <p:spTree>
+      <p:nvGrpSpPr>
+        <p:cNvPr id="1" name=""/>
+        <p:cNvGrpSpPr/>
+        <p:nvPr/>
+      </p:nvGrpSpPr>
+      <p:grpSpPr>
+        <a:xfrm>
+          <a:off x="0" y="0"/>
+          <a:ext cx="0" cy="0"/>
+          <a:chOff x="0" y="0"/>
+          <a:chExt cx="0" cy="0"/>
+        </a:xfrm>
+      </p:grpSpPr>
+      <p:sp>
+        <p:nvSpPr>
+          <p:cNvPr id="3" name="Content Placeholder 2"/>
+          <p:cNvSpPr>
+            <a:spLocks noGrp="1"/>
+          </p:cNvSpPr>
+          <p:nvPr>
+            <p:ph idx="1"/>
+          </p:nvPr>
+        </p:nvSpPr>
+        <p:spPr/>
+        <p:txBody>
+          <a:bodyPr>
+            <a:normAutofit/>
+          </a:bodyPr>
+          <a:lstStyle/>
+          <a:p>
+            <a:endParaRPr lang="en-US" dirty="0"/>
+          </a:p>
+        </p:txBody>
+      </p:sp>
+      <p:sp>
+        <p:nvSpPr>
+          <p:cNvPr id="2" name="Title 1"/>
+          <p:cNvSpPr>
+            <a:spLocks noGrp="1"/>
+          </p:cNvSpPr>
+          <p:nvPr>
+            <p:ph type="title"/>
+          </p:nvPr>
+        </p:nvSpPr>
+        <p:spPr/>
+        <p:txBody>
+          <a:bodyPr/>
+          <a:lstStyle/>
+          <a:p>
+            <a:r>
+              <a:rPr lang="en-US" dirty="0"/>
+              <a:t>Underlying class diagrams </a:t>
+            </a:r>
+            <a:r>
+              <a:rPr lang="en-US" dirty="0"/>
+              <a:t> -- TODO: CW</a:t>
+            </a:r>
+            <a:endParaRPr lang="en-US" dirty="0"/>
+          </a:p>
+        </p:txBody>
+      </p:sp>
+    </p:spTree>
+    <p:extLst>
+      <p:ext uri="{BB962C8B-B14F-4D97-AF65-F5344CB8AC3E}">
+        <p14:creationId xmlns:p14="http://schemas.microsoft.com/office/powerpoint/2010/main" val="1719944164"/>
+      </p:ext>
+    </p:extLst>
+  </p:cSld>
+  <p:clrMapOvr>
+    <a:masterClrMapping/>
+  </p:clrMapOvr>
+  <mc:AlternateContent xmlns:mc="http://schemas.openxmlformats.org/markup-compatibility/2006" xmlns:p14="http://schemas.microsoft.com/office/powerpoint/2010/main">
+    <mc:Choice Requires="p14">
+      <p:transition spd="med" p14:dur="700">
+        <p:fade/>
+      </p:transition>
+    </mc:Choice>
+    <mc:Fallback xmlns="">
+      <p:transition spd="med">
+        <p:fade/>
+      </p:transition>
+    </mc:Fallback>
+  </mc:AlternateContent>
+</p:sld>
+</file>
+
+<file path=ppt/slides/slide22.xml><?xml version="1.0" encoding="utf-8"?>
+<p:sld xmlns:a="http://schemas.openxmlformats.org/drawingml/2006/main" xmlns:r="http://schemas.openxmlformats.org/officeDocument/2006/relationships" xmlns:p="http://schemas.openxmlformats.org/presentationml/2006/main">
+  <p:cSld>
+    <p:spTree>
+      <p:nvGrpSpPr>
+        <p:cNvPr id="1" name=""/>
+        <p:cNvGrpSpPr/>
+        <p:nvPr/>
+      </p:nvGrpSpPr>
+      <p:grpSpPr>
+        <a:xfrm>
+          <a:off x="0" y="0"/>
+          <a:ext cx="0" cy="0"/>
+          <a:chOff x="0" y="0"/>
+          <a:chExt cx="0" cy="0"/>
+        </a:xfrm>
+      </p:grpSpPr>
+      <p:sp>
+        <p:nvSpPr>
+          <p:cNvPr id="3" name="Content Placeholder 2"/>
+          <p:cNvSpPr>
+            <a:spLocks noGrp="1"/>
+          </p:cNvSpPr>
+          <p:nvPr>
+            <p:ph idx="1"/>
+          </p:nvPr>
+        </p:nvSpPr>
+        <p:spPr/>
+        <p:txBody>
+          <a:bodyPr/>
+          <a:lstStyle/>
+          <a:p>
+            <a:endParaRPr lang="en-US" dirty="0"/>
+          </a:p>
+        </p:txBody>
+      </p:sp>
+      <p:sp>
+        <p:nvSpPr>
+          <p:cNvPr id="2" name="Title 1"/>
+          <p:cNvSpPr>
+            <a:spLocks noGrp="1"/>
+          </p:cNvSpPr>
+          <p:nvPr>
+            <p:ph type="title"/>
+          </p:nvPr>
+        </p:nvSpPr>
+        <p:spPr/>
+        <p:txBody>
+          <a:bodyPr/>
+          <a:lstStyle/>
+          <a:p>
+            <a:r>
+              <a:rPr lang="en-US"/>
+              <a:t>Get Involved!</a:t>
+            </a:r>
+            <a:endParaRPr lang="en-US" dirty="0"/>
+          </a:p>
+        </p:txBody>
+      </p:sp>
+    </p:spTree>
+    <p:extLst>
+      <p:ext uri="{BB962C8B-B14F-4D97-AF65-F5344CB8AC3E}">
+        <p14:creationId xmlns:p14="http://schemas.microsoft.com/office/powerpoint/2010/main" val="1603891575"/>
+      </p:ext>
+    </p:extLst>
+  </p:cSld>
+  <p:clrMapOvr>
+    <a:masterClrMapping/>
+  </p:clrMapOvr>
+  <mc:AlternateContent xmlns:mc="http://schemas.openxmlformats.org/markup-compatibility/2006" xmlns:p14="http://schemas.microsoft.com/office/powerpoint/2010/main">
+    <mc:Choice Requires="p14">
+      <p:transition spd="med" p14:dur="700">
+        <p:fade/>
+      </p:transition>
+    </mc:Choice>
+    <mc:Fallback xmlns="">
+      <p:transition spd="med">
+        <p:fade/>
+      </p:transition>
+    </mc:Fallback>
+  </mc:AlternateContent>
+</p:sld>
+</file>
+
+<file path=ppt/slides/slide23.xml><?xml version="1.0" encoding="utf-8"?>
+<p:sld xmlns:a="http://schemas.openxmlformats.org/drawingml/2006/main" xmlns:r="http://schemas.openxmlformats.org/officeDocument/2006/relationships" xmlns:p="http://schemas.openxmlformats.org/presentationml/2006/main">
+  <p:cSld>
+    <p:spTree>
+      <p:nvGrpSpPr>
+        <p:cNvPr id="1" name=""/>
+        <p:cNvGrpSpPr/>
+        <p:nvPr/>
+      </p:nvGrpSpPr>
+      <p:grpSpPr>
+        <a:xfrm>
+          <a:off x="0" y="0"/>
+          <a:ext cx="0" cy="0"/>
+          <a:chOff x="0" y="0"/>
+          <a:chExt cx="0" cy="0"/>
+        </a:xfrm>
+      </p:grpSpPr>
+      <p:pic>
+        <p:nvPicPr>
+          <p:cNvPr id="4" name="Content Placeholder 3"/>
+          <p:cNvPicPr>
+            <a:picLocks noGrp="1" noChangeAspect="1"/>
+          </p:cNvPicPr>
+          <p:nvPr>
+            <p:ph idx="1"/>
+          </p:nvPr>
+        </p:nvPicPr>
+        <p:blipFill>
+          <a:blip r:embed="rId2">
+            <a:extLst>
+              <a:ext uri="{28A0092B-C50C-407E-A947-70E740481C1C}">
+                <a14:useLocalDpi xmlns:a14="http://schemas.microsoft.com/office/drawing/2010/main" val="0"/>
+              </a:ext>
+            </a:extLst>
+          </a:blip>
+          <a:stretch>
+            <a:fillRect/>
+          </a:stretch>
+        </p:blipFill>
+        <p:spPr>
+          <a:xfrm>
+            <a:off x="2208212" y="1219200"/>
+            <a:ext cx="7679871" cy="4300728"/>
+          </a:xfrm>
+        </p:spPr>
+      </p:pic>
+    </p:spTree>
+    <p:extLst>
+      <p:ext uri="{BB962C8B-B14F-4D97-AF65-F5344CB8AC3E}">
+        <p14:creationId xmlns:p14="http://schemas.microsoft.com/office/powerpoint/2010/main" val="3111672502"/>
+      </p:ext>
+    </p:extLst>
+  </p:cSld>
+  <p:clrMapOvr>
+    <a:masterClrMapping/>
+  </p:clrMapOvr>
+  <mc:AlternateContent xmlns:mc="http://schemas.openxmlformats.org/markup-compatibility/2006" xmlns:p14="http://schemas.microsoft.com/office/powerpoint/2010/main">
+    <mc:Choice Requires="p14">
+      <p:transition spd="med" p14:dur="700">
+        <p:fade/>
+      </p:transition>
+    </mc:Choice>
+    <mc:Fallback xmlns="">
+      <p:transition spd="med">
+        <p:fade/>
+      </p:transition>
+    </mc:Fallback>
+  </mc:AlternateContent>
+</p:sld>
+</file>
+
+<file path=ppt/slides/slide24.xml><?xml version="1.0" encoding="utf-8"?>
+<p:sld xmlns:a="http://schemas.openxmlformats.org/drawingml/2006/main" xmlns:r="http://schemas.openxmlformats.org/officeDocument/2006/relationships" xmlns:p="http://schemas.openxmlformats.org/presentationml/2006/main">
+  <p:cSld>
+    <p:spTree>
+      <p:nvGrpSpPr>
+        <p:cNvPr id="1" name=""/>
+        <p:cNvGrpSpPr/>
+        <p:nvPr/>
+      </p:nvGrpSpPr>
+      <p:grpSpPr>
+        <a:xfrm>
+          <a:off x="0" y="0"/>
+          <a:ext cx="0" cy="0"/>
+          <a:chOff x="0" y="0"/>
+          <a:chExt cx="0" cy="0"/>
+        </a:xfrm>
+      </p:grpSpPr>
+      <p:sp>
+        <p:nvSpPr>
+          <p:cNvPr id="3" name="Content Placeholder 2"/>
+          <p:cNvSpPr>
+            <a:spLocks noGrp="1"/>
+          </p:cNvSpPr>
+          <p:nvPr>
+            <p:ph idx="1"/>
+          </p:nvPr>
+        </p:nvSpPr>
+        <p:spPr/>
+        <p:txBody>
+          <a:bodyPr/>
+          <a:lstStyle/>
+          <a:p>
+            <a:endParaRPr lang="en-US" dirty="0"/>
+          </a:p>
+        </p:txBody>
+      </p:sp>
+      <p:sp>
+        <p:nvSpPr>
+          <p:cNvPr id="2" name="Title 1"/>
+          <p:cNvSpPr>
+            <a:spLocks noGrp="1"/>
+          </p:cNvSpPr>
+          <p:nvPr>
+            <p:ph type="title"/>
+          </p:nvPr>
+        </p:nvSpPr>
+        <p:spPr/>
+        <p:txBody>
+          <a:bodyPr/>
+          <a:lstStyle/>
+          <a:p>
+            <a:r>
+              <a:rPr lang="en-US" dirty="0"/>
+              <a:t>Handouts</a:t>
+            </a:r>
+          </a:p>
+        </p:txBody>
+      </p:sp>
+    </p:spTree>
+    <p:extLst>
+      <p:ext uri="{BB962C8B-B14F-4D97-AF65-F5344CB8AC3E}">
+        <p14:creationId xmlns:p14="http://schemas.microsoft.com/office/powerpoint/2010/main" val="1097249794"/>
+      </p:ext>
+    </p:extLst>
+  </p:cSld>
+  <p:clrMapOvr>
+    <a:masterClrMapping/>
+  </p:clrMapOvr>
+  <mc:AlternateContent xmlns:mc="http://schemas.openxmlformats.org/markup-compatibility/2006" xmlns:p14="http://schemas.microsoft.com/office/powerpoint/2010/main">
+    <mc:Choice Requires="p14">
+      <p:transition spd="med" p14:dur="700">
+        <p:fade/>
+      </p:transition>
+    </mc:Choice>
+    <mc:Fallback xmlns="">
+      <p:transition spd="med">
+        <p:fade/>
+      </p:transition>
+    </mc:Fallback>
+  </mc:AlternateContent>
+</p:sld>
+</file>
+
 <file path=ppt/slides/slide3.xml><?xml version="1.0" encoding="utf-8"?>
 <p:sld xmlns:a="http://schemas.openxmlformats.org/drawingml/2006/main" xmlns:r="http://schemas.openxmlformats.org/officeDocument/2006/relationships" xmlns:p="http://schemas.openxmlformats.org/presentationml/2006/main">
   <p:cSld>
@@ -5189,7 +6737,6 @@
               <a:rPr lang="en-US" dirty="0"/>
               <a:t> and administers funding received under the federal Carl Perkins and Adult Education and Family Literacy Acts.</a:t>
             </a:r>
-            <a:endParaRPr lang="en-US" dirty="0"/>
           </a:p>
         </p:txBody>
       </p:sp>
@@ -5274,6 +6821,70 @@
           <a:p>
             <a:r>
               <a:rPr lang="en-US" dirty="0"/>
+              <a:t>Current system and problem</a:t>
+            </a:r>
+          </a:p>
+        </p:txBody>
+      </p:sp>
+    </p:spTree>
+    <p:extLst>
+      <p:ext uri="{BB962C8B-B14F-4D97-AF65-F5344CB8AC3E}">
+        <p14:creationId xmlns:p14="http://schemas.microsoft.com/office/powerpoint/2010/main" val="2816737614"/>
+      </p:ext>
+    </p:extLst>
+  </p:cSld>
+  <p:clrMapOvr>
+    <a:masterClrMapping/>
+  </p:clrMapOvr>
+  <mc:AlternateContent xmlns:mc="http://schemas.openxmlformats.org/markup-compatibility/2006" xmlns:p14="http://schemas.microsoft.com/office/powerpoint/2010/main">
+    <mc:Choice Requires="p14">
+      <p:transition spd="med" p14:dur="700">
+        <p:fade/>
+      </p:transition>
+    </mc:Choice>
+    <mc:Fallback xmlns="">
+      <p:transition spd="med">
+        <p:fade/>
+      </p:transition>
+    </mc:Fallback>
+  </mc:AlternateContent>
+</p:sld>
+</file>
+
+<file path=ppt/slides/slide5.xml><?xml version="1.0" encoding="utf-8"?>
+<p:sld xmlns:a="http://schemas.openxmlformats.org/drawingml/2006/main" xmlns:r="http://schemas.openxmlformats.org/officeDocument/2006/relationships" xmlns:p="http://schemas.openxmlformats.org/presentationml/2006/main">
+  <p:cSld>
+    <p:spTree>
+      <p:nvGrpSpPr>
+        <p:cNvPr id="1" name=""/>
+        <p:cNvGrpSpPr/>
+        <p:nvPr/>
+      </p:nvGrpSpPr>
+      <p:grpSpPr>
+        <a:xfrm>
+          <a:off x="0" y="0"/>
+          <a:ext cx="0" cy="0"/>
+          <a:chOff x="0" y="0"/>
+          <a:chExt cx="0" cy="0"/>
+        </a:xfrm>
+      </p:grpSpPr>
+      <p:sp>
+        <p:nvSpPr>
+          <p:cNvPr id="2" name="Title 1"/>
+          <p:cNvSpPr>
+            <a:spLocks noGrp="1"/>
+          </p:cNvSpPr>
+          <p:nvPr>
+            <p:ph type="title"/>
+          </p:nvPr>
+        </p:nvSpPr>
+        <p:spPr/>
+        <p:txBody>
+          <a:bodyPr/>
+          <a:lstStyle/>
+          <a:p>
+            <a:r>
+              <a:rPr lang="en-US" dirty="0"/>
               <a:t>File Upload on WTCS Portal</a:t>
             </a:r>
           </a:p>
@@ -5330,7 +6941,7 @@
 </p:sld>
 </file>
 
-<file path=ppt/slides/slide5.xml><?xml version="1.0" encoding="utf-8"?>
+<file path=ppt/slides/slide6.xml><?xml version="1.0" encoding="utf-8"?>
 <p:sld xmlns:a="http://schemas.openxmlformats.org/drawingml/2006/main" xmlns:r="http://schemas.openxmlformats.org/officeDocument/2006/relationships" xmlns:p="http://schemas.openxmlformats.org/presentationml/2006/main">
   <p:cSld>
     <p:spTree>
@@ -5420,96 +7031,6 @@
 </p:sld>
 </file>
 
-<file path=ppt/slides/slide6.xml><?xml version="1.0" encoding="utf-8"?>
-<p:sld xmlns:a="http://schemas.openxmlformats.org/drawingml/2006/main" xmlns:r="http://schemas.openxmlformats.org/officeDocument/2006/relationships" xmlns:p="http://schemas.openxmlformats.org/presentationml/2006/main">
-  <p:cSld>
-    <p:spTree>
-      <p:nvGrpSpPr>
-        <p:cNvPr id="1" name=""/>
-        <p:cNvGrpSpPr/>
-        <p:nvPr/>
-      </p:nvGrpSpPr>
-      <p:grpSpPr>
-        <a:xfrm>
-          <a:off x="0" y="0"/>
-          <a:ext cx="0" cy="0"/>
-          <a:chOff x="0" y="0"/>
-          <a:chExt cx="0" cy="0"/>
-        </a:xfrm>
-      </p:grpSpPr>
-      <p:sp>
-        <p:nvSpPr>
-          <p:cNvPr id="2" name="Title 1"/>
-          <p:cNvSpPr>
-            <a:spLocks noGrp="1"/>
-          </p:cNvSpPr>
-          <p:nvPr>
-            <p:ph type="title"/>
-          </p:nvPr>
-        </p:nvSpPr>
-        <p:spPr/>
-        <p:txBody>
-          <a:bodyPr/>
-          <a:lstStyle/>
-          <a:p>
-            <a:r>
-              <a:rPr lang="en-US" dirty="0"/>
-              <a:t>Failed File Submission</a:t>
-            </a:r>
-          </a:p>
-        </p:txBody>
-      </p:sp>
-      <p:pic>
-        <p:nvPicPr>
-          <p:cNvPr id="8" name="Content Placeholder 7"/>
-          <p:cNvPicPr>
-            <a:picLocks noGrp="1" noChangeAspect="1"/>
-          </p:cNvPicPr>
-          <p:nvPr>
-            <p:ph idx="1"/>
-          </p:nvPr>
-        </p:nvPicPr>
-        <p:blipFill>
-          <a:blip r:embed="rId2"/>
-          <a:stretch>
-            <a:fillRect/>
-          </a:stretch>
-        </p:blipFill>
-        <p:spPr>
-          <a:xfrm>
-            <a:off x="1357286" y="1498600"/>
-            <a:ext cx="9677400" cy="5172905"/>
-          </a:xfrm>
-          <a:prstGeom prst="rect">
-            <a:avLst/>
-          </a:prstGeom>
-        </p:spPr>
-      </p:pic>
-    </p:spTree>
-    <p:extLst>
-      <p:ext uri="{BB962C8B-B14F-4D97-AF65-F5344CB8AC3E}">
-        <p14:creationId xmlns:p14="http://schemas.microsoft.com/office/powerpoint/2010/main" val="397904132"/>
-      </p:ext>
-    </p:extLst>
-  </p:cSld>
-  <p:clrMapOvr>
-    <a:masterClrMapping/>
-  </p:clrMapOvr>
-  <mc:AlternateContent xmlns:mc="http://schemas.openxmlformats.org/markup-compatibility/2006" xmlns:p14="http://schemas.microsoft.com/office/powerpoint/2010/main">
-    <mc:Choice Requires="p14">
-      <p:transition spd="med" p14:dur="700">
-        <p:fade/>
-      </p:transition>
-    </mc:Choice>
-    <mc:Fallback xmlns="">
-      <p:transition spd="med">
-        <p:fade/>
-      </p:transition>
-    </mc:Fallback>
-  </mc:AlternateContent>
-</p:sld>
-</file>
-
 <file path=ppt/slides/slide7.xml><?xml version="1.0" encoding="utf-8"?>
 <p:sld xmlns:a="http://schemas.openxmlformats.org/drawingml/2006/main" xmlns:r="http://schemas.openxmlformats.org/officeDocument/2006/relationships" xmlns:p="http://schemas.openxmlformats.org/presentationml/2006/main">
   <p:cSld>
@@ -5529,27 +7050,6 @@
       </p:grpSpPr>
       <p:sp>
         <p:nvSpPr>
-          <p:cNvPr id="3" name="Content Placeholder 2"/>
-          <p:cNvSpPr>
-            <a:spLocks noGrp="1"/>
-          </p:cNvSpPr>
-          <p:nvPr>
-            <p:ph idx="1"/>
-          </p:nvPr>
-        </p:nvSpPr>
-        <p:spPr/>
-        <p:txBody>
-          <a:bodyPr>
-            <a:normAutofit/>
-          </a:bodyPr>
-          <a:lstStyle/>
-          <a:p>
-            <a:endParaRPr lang="en-US" dirty="0"/>
-          </a:p>
-        </p:txBody>
-      </p:sp>
-      <p:sp>
-        <p:nvSpPr>
           <p:cNvPr id="2" name="Title 1"/>
           <p:cNvSpPr>
             <a:spLocks noGrp="1"/>
@@ -5564,17 +7064,40 @@
           <a:lstStyle/>
           <a:p>
             <a:r>
-              <a:rPr lang="en-US"/>
-              <a:t>School Policies</a:t>
-            </a:r>
-            <a:endParaRPr lang="en-US" dirty="0"/>
-          </a:p>
-        </p:txBody>
-      </p:sp>
+              <a:rPr lang="en-US" dirty="0"/>
+              <a:t>Failed File Submission</a:t>
+            </a:r>
+          </a:p>
+        </p:txBody>
+      </p:sp>
+      <p:pic>
+        <p:nvPicPr>
+          <p:cNvPr id="4" name="Picture 3"/>
+          <p:cNvPicPr>
+            <a:picLocks noChangeAspect="1"/>
+          </p:cNvPicPr>
+          <p:nvPr/>
+        </p:nvPicPr>
+        <p:blipFill>
+          <a:blip r:embed="rId2"/>
+          <a:stretch>
+            <a:fillRect/>
+          </a:stretch>
+        </p:blipFill>
+        <p:spPr>
+          <a:xfrm>
+            <a:off x="1804545" y="1701800"/>
+            <a:ext cx="8480867" cy="4545257"/>
+          </a:xfrm>
+          <a:prstGeom prst="rect">
+            <a:avLst/>
+          </a:prstGeom>
+        </p:spPr>
+      </p:pic>
     </p:spTree>
     <p:extLst>
       <p:ext uri="{BB962C8B-B14F-4D97-AF65-F5344CB8AC3E}">
-        <p14:creationId xmlns:p14="http://schemas.microsoft.com/office/powerpoint/2010/main" val="977229791"/>
+        <p14:creationId xmlns:p14="http://schemas.microsoft.com/office/powerpoint/2010/main" val="397904132"/>
       </p:ext>
     </p:extLst>
   </p:cSld>
@@ -5615,12 +7138,12 @@
       </p:grpSpPr>
       <p:sp>
         <p:nvSpPr>
-          <p:cNvPr id="3" name="Content Placeholder 2"/>
-          <p:cNvSpPr>
-            <a:spLocks noGrp="1"/>
-          </p:cNvSpPr>
-          <p:nvPr>
-            <p:ph idx="1"/>
+          <p:cNvPr id="2" name="Title 1"/>
+          <p:cNvSpPr>
+            <a:spLocks noGrp="1"/>
+          </p:cNvSpPr>
+          <p:nvPr>
+            <p:ph type="title"/>
           </p:nvPr>
         </p:nvSpPr>
         <p:spPr/>
@@ -5628,37 +7151,17 @@
           <a:bodyPr/>
           <a:lstStyle/>
           <a:p>
-            <a:endParaRPr lang="en-US" dirty="0"/>
-          </a:p>
-        </p:txBody>
-      </p:sp>
-      <p:sp>
-        <p:nvSpPr>
-          <p:cNvPr id="2" name="Title 1"/>
-          <p:cNvSpPr>
-            <a:spLocks noGrp="1"/>
-          </p:cNvSpPr>
-          <p:nvPr>
-            <p:ph type="title"/>
-          </p:nvPr>
-        </p:nvSpPr>
-        <p:spPr/>
-        <p:txBody>
-          <a:bodyPr/>
-          <a:lstStyle/>
-          <a:p>
-            <a:r>
-              <a:rPr lang="en-US"/>
-              <a:t>Get Involved!</a:t>
-            </a:r>
-            <a:endParaRPr lang="en-US" dirty="0"/>
+            <a:r>
+              <a:rPr lang="en-US" dirty="0"/>
+              <a:t>Our solution  -- TODO: NK</a:t>
+            </a:r>
           </a:p>
         </p:txBody>
       </p:sp>
     </p:spTree>
     <p:extLst>
       <p:ext uri="{BB962C8B-B14F-4D97-AF65-F5344CB8AC3E}">
-        <p14:creationId xmlns:p14="http://schemas.microsoft.com/office/powerpoint/2010/main" val="1603891575"/>
+        <p14:creationId xmlns:p14="http://schemas.microsoft.com/office/powerpoint/2010/main" val="2284881217"/>
       </p:ext>
     </p:extLst>
   </p:cSld>
@@ -5697,39 +7200,53 @@
           <a:chExt cx="0" cy="0"/>
         </a:xfrm>
       </p:grpSpPr>
-      <p:pic>
-        <p:nvPicPr>
-          <p:cNvPr id="4" name="Content Placeholder 3"/>
-          <p:cNvPicPr>
-            <a:picLocks noGrp="1" noChangeAspect="1"/>
-          </p:cNvPicPr>
+      <p:sp>
+        <p:nvSpPr>
+          <p:cNvPr id="3" name="Content Placeholder 2"/>
+          <p:cNvSpPr>
+            <a:spLocks noGrp="1"/>
+          </p:cNvSpPr>
           <p:nvPr>
             <p:ph idx="1"/>
           </p:nvPr>
-        </p:nvPicPr>
-        <p:blipFill>
-          <a:blip r:embed="rId2">
-            <a:extLst>
-              <a:ext uri="{28A0092B-C50C-407E-A947-70E740481C1C}">
-                <a14:useLocalDpi xmlns:a14="http://schemas.microsoft.com/office/drawing/2010/main" val="0"/>
-              </a:ext>
-            </a:extLst>
-          </a:blip>
-          <a:stretch>
-            <a:fillRect/>
-          </a:stretch>
-        </p:blipFill>
-        <p:spPr>
-          <a:xfrm>
-            <a:off x="2208212" y="1219200"/>
-            <a:ext cx="7679871" cy="4300728"/>
-          </a:xfrm>
-        </p:spPr>
-      </p:pic>
+        </p:nvSpPr>
+        <p:spPr/>
+        <p:txBody>
+          <a:bodyPr>
+            <a:normAutofit/>
+          </a:bodyPr>
+          <a:lstStyle/>
+          <a:p>
+            <a:endParaRPr lang="en-US" dirty="0"/>
+          </a:p>
+        </p:txBody>
+      </p:sp>
+      <p:sp>
+        <p:nvSpPr>
+          <p:cNvPr id="2" name="Title 1"/>
+          <p:cNvSpPr>
+            <a:spLocks noGrp="1"/>
+          </p:cNvSpPr>
+          <p:nvPr>
+            <p:ph type="title"/>
+          </p:nvPr>
+        </p:nvSpPr>
+        <p:spPr/>
+        <p:txBody>
+          <a:bodyPr/>
+          <a:lstStyle/>
+          <a:p>
+            <a:r>
+              <a:rPr lang="en-US" dirty="0"/>
+              <a:t>School Policies  -- TODO NK</a:t>
+            </a:r>
+          </a:p>
+        </p:txBody>
+      </p:sp>
     </p:spTree>
     <p:extLst>
       <p:ext uri="{BB962C8B-B14F-4D97-AF65-F5344CB8AC3E}">
-        <p14:creationId xmlns:p14="http://schemas.microsoft.com/office/powerpoint/2010/main" val="3111672502"/>
+        <p14:creationId xmlns:p14="http://schemas.microsoft.com/office/powerpoint/2010/main" val="977229791"/>
       </p:ext>
     </p:extLst>
   </p:cSld>

</xml_diff>